<commit_message>
Adicionando lista de itens que deverão estar no LLD
</commit_message>
<xml_diff>
--- a/Arquitetura-de-TI/HLD-LLD.pptx
+++ b/Arquitetura-de-TI/HLD-LLD.pptx
@@ -8,7 +8,8 @@
   <p:sldIdLst>
     <p:sldId id="256" r:id="rId3"/>
     <p:sldId id="258" r:id="rId4"/>
-    <p:sldId id="257" r:id="rId5"/>
+    <p:sldId id="259" r:id="rId5"/>
+    <p:sldId id="257" r:id="rId6"/>
   </p:sldIdLst>
   <p:sldSz cx="12192000" cy="6858000"/>
   <p:notesSz cx="6858000" cy="9144000"/>
@@ -257,7 +258,7 @@
           <a:p>
             <a:fld id="{82869B3E-A76A-4689-B656-33BE798491C8}" type="datetimeFigureOut">
               <a:rPr lang="pt-BR" smtClean="0"/>
-              <a:t>19/09/2019</a:t>
+              <a:t>26/09/2019</a:t>
             </a:fld>
             <a:endParaRPr lang="pt-BR"/>
           </a:p>
@@ -427,7 +428,7 @@
           <a:p>
             <a:fld id="{82869B3E-A76A-4689-B656-33BE798491C8}" type="datetimeFigureOut">
               <a:rPr lang="pt-BR" smtClean="0"/>
-              <a:t>19/09/2019</a:t>
+              <a:t>26/09/2019</a:t>
             </a:fld>
             <a:endParaRPr lang="pt-BR"/>
           </a:p>
@@ -607,7 +608,7 @@
           <a:p>
             <a:fld id="{82869B3E-A76A-4689-B656-33BE798491C8}" type="datetimeFigureOut">
               <a:rPr lang="pt-BR" smtClean="0"/>
-              <a:t>19/09/2019</a:t>
+              <a:t>26/09/2019</a:t>
             </a:fld>
             <a:endParaRPr lang="pt-BR"/>
           </a:p>
@@ -1413,7 +1414,7 @@
           <a:p>
             <a:fld id="{82869B3E-A76A-4689-B656-33BE798491C8}" type="datetimeFigureOut">
               <a:rPr lang="pt-BR" smtClean="0"/>
-              <a:t>19/09/2019</a:t>
+              <a:t>26/09/2019</a:t>
             </a:fld>
             <a:endParaRPr lang="pt-BR"/>
           </a:p>
@@ -1583,7 +1584,7 @@
           <a:p>
             <a:fld id="{82869B3E-A76A-4689-B656-33BE798491C8}" type="datetimeFigureOut">
               <a:rPr lang="pt-BR" smtClean="0"/>
-              <a:t>19/09/2019</a:t>
+              <a:t>26/09/2019</a:t>
             </a:fld>
             <a:endParaRPr lang="pt-BR"/>
           </a:p>
@@ -1830,7 +1831,7 @@
           <a:p>
             <a:fld id="{82869B3E-A76A-4689-B656-33BE798491C8}" type="datetimeFigureOut">
               <a:rPr lang="pt-BR" smtClean="0"/>
-              <a:t>19/09/2019</a:t>
+              <a:t>26/09/2019</a:t>
             </a:fld>
             <a:endParaRPr lang="pt-BR"/>
           </a:p>
@@ -2062,7 +2063,7 @@
           <a:p>
             <a:fld id="{82869B3E-A76A-4689-B656-33BE798491C8}" type="datetimeFigureOut">
               <a:rPr lang="pt-BR" smtClean="0"/>
-              <a:t>19/09/2019</a:t>
+              <a:t>26/09/2019</a:t>
             </a:fld>
             <a:endParaRPr lang="pt-BR"/>
           </a:p>
@@ -2436,7 +2437,7 @@
           <a:p>
             <a:fld id="{82869B3E-A76A-4689-B656-33BE798491C8}" type="datetimeFigureOut">
               <a:rPr lang="pt-BR" smtClean="0"/>
-              <a:t>19/09/2019</a:t>
+              <a:t>26/09/2019</a:t>
             </a:fld>
             <a:endParaRPr lang="pt-BR"/>
           </a:p>
@@ -2559,7 +2560,7 @@
           <a:p>
             <a:fld id="{82869B3E-A76A-4689-B656-33BE798491C8}" type="datetimeFigureOut">
               <a:rPr lang="pt-BR" smtClean="0"/>
-              <a:t>19/09/2019</a:t>
+              <a:t>26/09/2019</a:t>
             </a:fld>
             <a:endParaRPr lang="pt-BR"/>
           </a:p>
@@ -2654,7 +2655,7 @@
           <a:p>
             <a:fld id="{82869B3E-A76A-4689-B656-33BE798491C8}" type="datetimeFigureOut">
               <a:rPr lang="pt-BR" smtClean="0"/>
-              <a:t>19/09/2019</a:t>
+              <a:t>26/09/2019</a:t>
             </a:fld>
             <a:endParaRPr lang="pt-BR"/>
           </a:p>
@@ -2909,7 +2910,7 @@
           <a:p>
             <a:fld id="{82869B3E-A76A-4689-B656-33BE798491C8}" type="datetimeFigureOut">
               <a:rPr lang="pt-BR" smtClean="0"/>
-              <a:t>19/09/2019</a:t>
+              <a:t>26/09/2019</a:t>
             </a:fld>
             <a:endParaRPr lang="pt-BR"/>
           </a:p>
@@ -3079,7 +3080,7 @@
           <a:p>
             <a:fld id="{82869B3E-A76A-4689-B656-33BE798491C8}" type="datetimeFigureOut">
               <a:rPr lang="pt-BR" smtClean="0"/>
-              <a:t>19/09/2019</a:t>
+              <a:t>26/09/2019</a:t>
             </a:fld>
             <a:endParaRPr lang="pt-BR"/>
           </a:p>
@@ -3384,7 +3385,7 @@
           <a:p>
             <a:fld id="{82869B3E-A76A-4689-B656-33BE798491C8}" type="datetimeFigureOut">
               <a:rPr lang="pt-BR" smtClean="0"/>
-              <a:t>19/09/2019</a:t>
+              <a:t>26/09/2019</a:t>
             </a:fld>
             <a:endParaRPr lang="pt-BR"/>
           </a:p>
@@ -3593,7 +3594,7 @@
           <a:p>
             <a:fld id="{82869B3E-A76A-4689-B656-33BE798491C8}" type="datetimeFigureOut">
               <a:rPr lang="pt-BR" smtClean="0"/>
-              <a:t>19/09/2019</a:t>
+              <a:t>26/09/2019</a:t>
             </a:fld>
             <a:endParaRPr lang="pt-BR"/>
           </a:p>
@@ -3907,7 +3908,7 @@
           <a:p>
             <a:fld id="{82869B3E-A76A-4689-B656-33BE798491C8}" type="datetimeFigureOut">
               <a:rPr lang="pt-BR" smtClean="0"/>
-              <a:t>19/09/2019</a:t>
+              <a:t>26/09/2019</a:t>
             </a:fld>
             <a:endParaRPr lang="pt-BR"/>
           </a:p>
@@ -4240,7 +4241,7 @@
           <a:p>
             <a:fld id="{82869B3E-A76A-4689-B656-33BE798491C8}" type="datetimeFigureOut">
               <a:rPr lang="pt-BR" smtClean="0"/>
-              <a:t>19/09/2019</a:t>
+              <a:t>26/09/2019</a:t>
             </a:fld>
             <a:endParaRPr lang="pt-BR"/>
           </a:p>
@@ -4554,7 +4555,7 @@
           <a:p>
             <a:fld id="{82869B3E-A76A-4689-B656-33BE798491C8}" type="datetimeFigureOut">
               <a:rPr lang="pt-BR" smtClean="0"/>
-              <a:t>19/09/2019</a:t>
+              <a:t>26/09/2019</a:t>
             </a:fld>
             <a:endParaRPr lang="pt-BR"/>
           </a:p>
@@ -4947,7 +4948,7 @@
           <a:p>
             <a:fld id="{82869B3E-A76A-4689-B656-33BE798491C8}" type="datetimeFigureOut">
               <a:rPr lang="pt-BR" smtClean="0"/>
-              <a:t>19/09/2019</a:t>
+              <a:t>26/09/2019</a:t>
             </a:fld>
             <a:endParaRPr lang="pt-BR"/>
           </a:p>
@@ -5117,7 +5118,7 @@
           <a:p>
             <a:fld id="{82869B3E-A76A-4689-B656-33BE798491C8}" type="datetimeFigureOut">
               <a:rPr lang="pt-BR" smtClean="0"/>
-              <a:t>19/09/2019</a:t>
+              <a:t>26/09/2019</a:t>
             </a:fld>
             <a:endParaRPr lang="pt-BR"/>
           </a:p>
@@ -5297,7 +5298,7 @@
           <a:p>
             <a:fld id="{82869B3E-A76A-4689-B656-33BE798491C8}" type="datetimeFigureOut">
               <a:rPr lang="pt-BR" smtClean="0"/>
-              <a:t>19/09/2019</a:t>
+              <a:t>26/09/2019</a:t>
             </a:fld>
             <a:endParaRPr lang="pt-BR"/>
           </a:p>
@@ -5548,7 +5549,7 @@
           <a:p>
             <a:fld id="{82869B3E-A76A-4689-B656-33BE798491C8}" type="datetimeFigureOut">
               <a:rPr lang="pt-BR" smtClean="0"/>
-              <a:t>19/09/2019</a:t>
+              <a:t>26/09/2019</a:t>
             </a:fld>
             <a:endParaRPr lang="pt-BR"/>
           </a:p>
@@ -5780,7 +5781,7 @@
           <a:p>
             <a:fld id="{82869B3E-A76A-4689-B656-33BE798491C8}" type="datetimeFigureOut">
               <a:rPr lang="pt-BR" smtClean="0"/>
-              <a:t>19/09/2019</a:t>
+              <a:t>26/09/2019</a:t>
             </a:fld>
             <a:endParaRPr lang="pt-BR"/>
           </a:p>
@@ -6127,7 +6128,7 @@
           <a:p>
             <a:fld id="{82869B3E-A76A-4689-B656-33BE798491C8}" type="datetimeFigureOut">
               <a:rPr lang="pt-BR" smtClean="0"/>
-              <a:t>19/09/2019</a:t>
+              <a:t>26/09/2019</a:t>
             </a:fld>
             <a:endParaRPr lang="pt-BR"/>
           </a:p>
@@ -6245,7 +6246,7 @@
           <a:p>
             <a:fld id="{82869B3E-A76A-4689-B656-33BE798491C8}" type="datetimeFigureOut">
               <a:rPr lang="pt-BR" smtClean="0"/>
-              <a:t>19/09/2019</a:t>
+              <a:t>26/09/2019</a:t>
             </a:fld>
             <a:endParaRPr lang="pt-BR"/>
           </a:p>
@@ -6363,7 +6364,7 @@
           <a:p>
             <a:fld id="{82869B3E-A76A-4689-B656-33BE798491C8}" type="datetimeFigureOut">
               <a:rPr lang="pt-BR" smtClean="0"/>
-              <a:t>19/09/2019</a:t>
+              <a:t>26/09/2019</a:t>
             </a:fld>
             <a:endParaRPr lang="pt-BR"/>
           </a:p>
@@ -6647,7 +6648,7 @@
           <a:p>
             <a:fld id="{82869B3E-A76A-4689-B656-33BE798491C8}" type="datetimeFigureOut">
               <a:rPr lang="pt-BR" smtClean="0"/>
-              <a:t>19/09/2019</a:t>
+              <a:t>26/09/2019</a:t>
             </a:fld>
             <a:endParaRPr lang="pt-BR"/>
           </a:p>
@@ -6911,7 +6912,7 @@
           <a:p>
             <a:fld id="{82869B3E-A76A-4689-B656-33BE798491C8}" type="datetimeFigureOut">
               <a:rPr lang="pt-BR" smtClean="0"/>
-              <a:t>19/09/2019</a:t>
+              <a:t>26/09/2019</a:t>
             </a:fld>
             <a:endParaRPr lang="pt-BR"/>
           </a:p>
@@ -7148,7 +7149,7 @@
           <a:p>
             <a:fld id="{82869B3E-A76A-4689-B656-33BE798491C8}" type="datetimeFigureOut">
               <a:rPr lang="pt-BR" smtClean="0"/>
-              <a:t>19/09/2019</a:t>
+              <a:t>26/09/2019</a:t>
             </a:fld>
             <a:endParaRPr lang="pt-BR"/>
           </a:p>
@@ -8208,7 +8209,7 @@
           <a:p>
             <a:fld id="{82869B3E-A76A-4689-B656-33BE798491C8}" type="datetimeFigureOut">
               <a:rPr lang="pt-BR" smtClean="0"/>
-              <a:t>19/09/2019</a:t>
+              <a:t>26/09/2019</a:t>
             </a:fld>
             <a:endParaRPr lang="pt-BR"/>
           </a:p>
@@ -9528,6 +9529,274 @@
 </file>
 
 <file path=ppt/slides/slide3.xml><?xml version="1.0" encoding="utf-8"?>
+<p:sld xmlns:a="http://schemas.openxmlformats.org/drawingml/2006/main" xmlns:r="http://schemas.openxmlformats.org/officeDocument/2006/relationships" xmlns:p="http://schemas.openxmlformats.org/presentationml/2006/main">
+  <p:cSld>
+    <p:spTree>
+      <p:nvGrpSpPr>
+        <p:cNvPr id="1" name=""/>
+        <p:cNvGrpSpPr/>
+        <p:nvPr/>
+      </p:nvGrpSpPr>
+      <p:grpSpPr>
+        <a:xfrm>
+          <a:off x="0" y="0"/>
+          <a:ext cx="0" cy="0"/>
+          <a:chOff x="0" y="0"/>
+          <a:chExt cx="0" cy="0"/>
+        </a:xfrm>
+      </p:grpSpPr>
+      <p:sp>
+        <p:nvSpPr>
+          <p:cNvPr id="4" name="CaixaDeTexto 3"/>
+          <p:cNvSpPr txBox="1"/>
+          <p:nvPr/>
+        </p:nvSpPr>
+        <p:spPr>
+          <a:xfrm>
+            <a:off x="604912" y="406331"/>
+            <a:ext cx="8904847" cy="5078313"/>
+          </a:xfrm>
+          <a:prstGeom prst="rect">
+            <a:avLst/>
+          </a:prstGeom>
+          <a:noFill/>
+        </p:spPr>
+        <p:txBody>
+          <a:bodyPr wrap="square" rtlCol="0">
+            <a:spAutoFit/>
+          </a:bodyPr>
+          <a:lstStyle/>
+          <a:p>
+            <a:pPr marL="285750" indent="-285750">
+              <a:buFontTx/>
+              <a:buChar char="-"/>
+            </a:pPr>
+            <a:r>
+              <a:rPr lang="pt-BR" dirty="0" smtClean="0"/>
+              <a:t>Cliente busca uma empresa para refrig</a:t>
+            </a:r>
+            <a:r>
+              <a:rPr lang="pt-BR" dirty="0" smtClean="0"/>
+              <a:t>eração de tomate</a:t>
+            </a:r>
+          </a:p>
+          <a:p>
+            <a:pPr marL="285750" indent="-285750">
+              <a:buFontTx/>
+              <a:buChar char="-"/>
+            </a:pPr>
+            <a:r>
+              <a:rPr lang="pt-BR" dirty="0" smtClean="0"/>
+              <a:t>Encontra nossa empresa</a:t>
+            </a:r>
+          </a:p>
+          <a:p>
+            <a:pPr marL="285750" indent="-285750">
+              <a:buFontTx/>
+              <a:buChar char="-"/>
+            </a:pPr>
+            <a:r>
+              <a:rPr lang="pt-BR" dirty="0" smtClean="0"/>
+              <a:t>Entra no site</a:t>
+            </a:r>
+          </a:p>
+          <a:p>
+            <a:pPr marL="285750" indent="-285750">
+              <a:buFontTx/>
+              <a:buChar char="-"/>
+            </a:pPr>
+            <a:r>
+              <a:rPr lang="pt-BR" dirty="0" smtClean="0"/>
+              <a:t>Contata a nossa empresa</a:t>
+            </a:r>
+          </a:p>
+          <a:p>
+            <a:pPr marL="285750" indent="-285750">
+              <a:buFontTx/>
+              <a:buChar char="-"/>
+            </a:pPr>
+            <a:r>
+              <a:rPr lang="pt-BR" dirty="0" smtClean="0"/>
+              <a:t>Faz o cadastro</a:t>
+            </a:r>
+          </a:p>
+          <a:p>
+            <a:pPr marL="285750" indent="-285750">
+              <a:buFontTx/>
+              <a:buChar char="-"/>
+            </a:pPr>
+            <a:r>
+              <a:rPr lang="pt-BR" dirty="0" smtClean="0"/>
+              <a:t>Envia as informações necessárias para prestarmos o serviço</a:t>
+            </a:r>
+          </a:p>
+          <a:p>
+            <a:pPr marL="285750" indent="-285750">
+              <a:buFontTx/>
+              <a:buChar char="-"/>
+            </a:pPr>
+            <a:r>
+              <a:rPr lang="pt-BR" dirty="0" smtClean="0"/>
+              <a:t>Os dados são enviados pel</a:t>
+            </a:r>
+            <a:r>
+              <a:rPr lang="pt-BR" dirty="0" smtClean="0"/>
+              <a:t>o Wi-Fi para a nuvem da Microsoft (</a:t>
+            </a:r>
+            <a:r>
+              <a:rPr lang="pt-BR" dirty="0" err="1" smtClean="0"/>
+              <a:t>Azure</a:t>
+            </a:r>
+            <a:r>
+              <a:rPr lang="pt-BR" dirty="0" smtClean="0"/>
+              <a:t>)</a:t>
+            </a:r>
+          </a:p>
+          <a:p>
+            <a:pPr marL="285750" indent="-285750">
+              <a:buFontTx/>
+              <a:buChar char="-"/>
+            </a:pPr>
+            <a:r>
+              <a:rPr lang="pt-BR" dirty="0" smtClean="0"/>
+              <a:t>Os dados são armazenados no </a:t>
+            </a:r>
+            <a:r>
+              <a:rPr lang="pt-BR" dirty="0" err="1" smtClean="0"/>
+              <a:t>Azure</a:t>
+            </a:r>
+            <a:endParaRPr lang="pt-BR" dirty="0" smtClean="0"/>
+          </a:p>
+          <a:p>
+            <a:pPr marL="285750" indent="-285750">
+              <a:buFontTx/>
+              <a:buChar char="-"/>
+            </a:pPr>
+            <a:r>
+              <a:rPr lang="pt-BR" dirty="0" smtClean="0"/>
+              <a:t>Com os dados, programamos a placa</a:t>
+            </a:r>
+            <a:r>
+              <a:rPr lang="pt-BR" dirty="0"/>
+              <a:t> </a:t>
+            </a:r>
+            <a:r>
+              <a:rPr lang="pt-BR" dirty="0" err="1" smtClean="0"/>
+              <a:t>Arduino</a:t>
+            </a:r>
+            <a:r>
+              <a:rPr lang="pt-BR" dirty="0" smtClean="0"/>
+              <a:t> Uno com sensor DHT11 para captura de temperatura, umidade e GPS para </a:t>
+            </a:r>
+            <a:r>
+              <a:rPr lang="pt-BR" dirty="0" err="1" smtClean="0"/>
+              <a:t>geolocalização</a:t>
+            </a:r>
+            <a:endParaRPr lang="pt-BR" dirty="0" smtClean="0"/>
+          </a:p>
+          <a:p>
+            <a:pPr marL="285750" indent="-285750">
+              <a:buFontTx/>
+              <a:buChar char="-"/>
+            </a:pPr>
+            <a:r>
+              <a:rPr lang="pt-BR" dirty="0" smtClean="0"/>
+              <a:t>Contatamos o cliente para fazer a instalação</a:t>
+            </a:r>
+          </a:p>
+          <a:p>
+            <a:pPr marL="285750" indent="-285750">
+              <a:buFontTx/>
+              <a:buChar char="-"/>
+            </a:pPr>
+            <a:r>
+              <a:rPr lang="pt-BR" dirty="0" smtClean="0"/>
+              <a:t>Vamos até o cliente</a:t>
+            </a:r>
+          </a:p>
+          <a:p>
+            <a:pPr marL="285750" indent="-285750">
+              <a:buFontTx/>
+              <a:buChar char="-"/>
+            </a:pPr>
+            <a:r>
+              <a:rPr lang="pt-BR" dirty="0" smtClean="0"/>
+              <a:t>Fazemos a instalação do sensor</a:t>
+            </a:r>
+          </a:p>
+          <a:p>
+            <a:pPr marL="285750" indent="-285750">
+              <a:buFontTx/>
+              <a:buChar char="-"/>
+            </a:pPr>
+            <a:r>
+              <a:rPr lang="pt-BR" dirty="0" smtClean="0"/>
+              <a:t>Programamos alertas conforme temperatura e umidade informadas</a:t>
+            </a:r>
+          </a:p>
+          <a:p>
+            <a:pPr marL="285750" indent="-285750">
+              <a:buFontTx/>
+              <a:buChar char="-"/>
+            </a:pPr>
+            <a:r>
+              <a:rPr lang="pt-BR" dirty="0" smtClean="0"/>
+              <a:t>Os dados serão conectados ao celular do distribuidor por meio do </a:t>
+            </a:r>
+            <a:r>
+              <a:rPr lang="pt-BR" dirty="0" err="1" smtClean="0"/>
+              <a:t>app</a:t>
+            </a:r>
+            <a:endParaRPr lang="pt-BR" dirty="0" smtClean="0"/>
+          </a:p>
+          <a:p>
+            <a:pPr marL="285750" indent="-285750">
+              <a:buFontTx/>
+              <a:buChar char="-"/>
+            </a:pPr>
+            <a:r>
+              <a:rPr lang="pt-BR" dirty="0" smtClean="0"/>
+              <a:t>Os dados serão enviados por Wi-Fi e serão enviados e armazenados em um banco de dados no </a:t>
+            </a:r>
+            <a:r>
+              <a:rPr lang="pt-BR" dirty="0" err="1" smtClean="0"/>
+              <a:t>Azure</a:t>
+            </a:r>
+            <a:r>
+              <a:rPr lang="pt-BR" dirty="0" smtClean="0"/>
+              <a:t> com o auxílio de uma aplicação Node.JS</a:t>
+            </a:r>
+          </a:p>
+          <a:p>
+            <a:pPr marL="285750" indent="-285750">
+              <a:buFontTx/>
+              <a:buChar char="-"/>
+            </a:pPr>
+            <a:endParaRPr lang="pt-BR" dirty="0" smtClean="0"/>
+          </a:p>
+        </p:txBody>
+      </p:sp>
+    </p:spTree>
+    <p:extLst>
+      <p:ext uri="{BB962C8B-B14F-4D97-AF65-F5344CB8AC3E}">
+        <p14:creationId xmlns:p14="http://schemas.microsoft.com/office/powerpoint/2010/main" val="2663517940"/>
+      </p:ext>
+    </p:extLst>
+  </p:cSld>
+  <p:clrMapOvr>
+    <a:masterClrMapping/>
+  </p:clrMapOvr>
+  <p:timing>
+    <p:tnLst>
+      <p:par>
+        <p:cTn id="1" dur="indefinite" restart="never" nodeType="tmRoot"/>
+      </p:par>
+    </p:tnLst>
+  </p:timing>
+</p:sld>
+</file>
+
+<file path=ppt/slides/slide4.xml><?xml version="1.0" encoding="utf-8"?>
 <p:sld xmlns:a="http://schemas.openxmlformats.org/drawingml/2006/main" xmlns:r="http://schemas.openxmlformats.org/officeDocument/2006/relationships" xmlns:p="http://schemas.openxmlformats.org/presentationml/2006/main">
   <p:cSld>
     <p:bg>

</xml_diff>